<commit_message>
more slides for the afternoon
</commit_message>
<xml_diff>
--- a/slides/A-01-02-Proofs-Structure.pptx
+++ b/slides/A-01-02-Proofs-Structure.pptx
@@ -5,14 +5,17 @@
     <p:sldMasterId id="2147483649" r:id="rId1"/>
   </p:sldMasterIdLst>
   <p:notesMasterIdLst>
-    <p:notesMasterId r:id="rId4"/>
+    <p:notesMasterId r:id="rId7"/>
   </p:notesMasterIdLst>
   <p:handoutMasterIdLst>
-    <p:handoutMasterId r:id="rId5"/>
+    <p:handoutMasterId r:id="rId8"/>
   </p:handoutMasterIdLst>
   <p:sldIdLst>
     <p:sldId id="258" r:id="rId2"/>
     <p:sldId id="1911" r:id="rId3"/>
+    <p:sldId id="1912" r:id="rId4"/>
+    <p:sldId id="1914" r:id="rId5"/>
+    <p:sldId id="1913" r:id="rId6"/>
   </p:sldIdLst>
   <p:sldSz cx="9144000" cy="6858000" type="screen4x3"/>
   <p:notesSz cx="6858000" cy="9144000"/>
@@ -1131,6 +1134,543 @@
     <p:extLst>
       <p:ext uri="{BB962C8B-B14F-4D97-AF65-F5344CB8AC3E}">
         <p14:creationId xmlns:p14="http://schemas.microsoft.com/office/powerpoint/2010/main" val="2787644252"/>
+      </p:ext>
+    </p:extLst>
+  </p:cSld>
+  <p:clrMapOvr>
+    <a:masterClrMapping/>
+  </p:clrMapOvr>
+</p:notes>
+</file>
+
+<file path=ppt/notesSlides/notesSlide3.xml><?xml version="1.0" encoding="utf-8"?>
+<p:notes xmlns:a="http://schemas.openxmlformats.org/drawingml/2006/main" xmlns:r="http://schemas.openxmlformats.org/officeDocument/2006/relationships" xmlns:p="http://schemas.openxmlformats.org/presentationml/2006/main">
+  <p:cSld>
+    <p:spTree>
+      <p:nvGrpSpPr>
+        <p:cNvPr id="1" name="">
+          <a:extLst>
+            <a:ext uri="{FF2B5EF4-FFF2-40B4-BE49-F238E27FC236}">
+              <a16:creationId xmlns:a16="http://schemas.microsoft.com/office/drawing/2014/main" id="{EFA2519B-F27B-E568-831B-274C828497D2}"/>
+            </a:ext>
+          </a:extLst>
+        </p:cNvPr>
+        <p:cNvGrpSpPr/>
+        <p:nvPr/>
+      </p:nvGrpSpPr>
+      <p:grpSpPr>
+        <a:xfrm>
+          <a:off x="0" y="0"/>
+          <a:ext cx="0" cy="0"/>
+          <a:chOff x="0" y="0"/>
+          <a:chExt cx="0" cy="0"/>
+        </a:xfrm>
+      </p:grpSpPr>
+      <p:sp>
+        <p:nvSpPr>
+          <p:cNvPr id="2" name="Slide Image Placeholder 1">
+            <a:extLst>
+              <a:ext uri="{FF2B5EF4-FFF2-40B4-BE49-F238E27FC236}">
+                <a16:creationId xmlns:a16="http://schemas.microsoft.com/office/drawing/2014/main" id="{E92D0874-8AE3-5F59-AFBE-90C3EB174D14}"/>
+              </a:ext>
+            </a:extLst>
+          </p:cNvPr>
+          <p:cNvSpPr>
+            <a:spLocks noGrp="1" noRot="1" noChangeAspect="1"/>
+          </p:cNvSpPr>
+          <p:nvPr>
+            <p:ph type="sldImg"/>
+          </p:nvPr>
+        </p:nvSpPr>
+        <p:spPr/>
+      </p:sp>
+      <p:sp>
+        <p:nvSpPr>
+          <p:cNvPr id="3" name="Notes Placeholder 2">
+            <a:extLst>
+              <a:ext uri="{FF2B5EF4-FFF2-40B4-BE49-F238E27FC236}">
+                <a16:creationId xmlns:a16="http://schemas.microsoft.com/office/drawing/2014/main" id="{60E48546-9DBD-C194-F9B4-AA6220B8B254}"/>
+              </a:ext>
+            </a:extLst>
+          </p:cNvPr>
+          <p:cNvSpPr>
+            <a:spLocks noGrp="1"/>
+          </p:cNvSpPr>
+          <p:nvPr>
+            <p:ph type="body" idx="1"/>
+          </p:nvPr>
+        </p:nvSpPr>
+        <p:spPr/>
+        <p:txBody>
+          <a:bodyPr/>
+          <a:lstStyle/>
+          <a:p>
+            <a:r>
+              <a:rPr lang="en-US" dirty="0">
+                <a:latin typeface="Tahoma" panose="020B0604030504040204" pitchFamily="34" charset="0"/>
+                <a:ea typeface="Tahoma" panose="020B0604030504040204" pitchFamily="34" charset="0"/>
+                <a:cs typeface="Tahoma" panose="020B0604030504040204" pitchFamily="34" charset="0"/>
+              </a:rPr>
+              <a:t>The framework that we will be using for this work is HAMR -- a model-driven development tool chain for high assurance embedded systems that emphasizes three layers of development:</a:t>
+            </a:r>
+          </a:p>
+          <a:p>
+            <a:endParaRPr lang="en-US" dirty="0">
+              <a:latin typeface="Tahoma" panose="020B0604030504040204" pitchFamily="34" charset="0"/>
+              <a:ea typeface="Tahoma" panose="020B0604030504040204" pitchFamily="34" charset="0"/>
+              <a:cs typeface="Tahoma" panose="020B0604030504040204" pitchFamily="34" charset="0"/>
+            </a:endParaRPr>
+          </a:p>
+          <a:p>
+            <a:r>
+              <a:rPr lang="en-US" dirty="0">
+                <a:latin typeface="Tahoma" panose="020B0604030504040204" pitchFamily="34" charset="0"/>
+                <a:ea typeface="Tahoma" panose="020B0604030504040204" pitchFamily="34" charset="0"/>
+                <a:cs typeface="Tahoma" panose="020B0604030504040204" pitchFamily="34" charset="0"/>
+              </a:rPr>
+              <a:t>Modeling, analysis and verification in the AADL modeling language, leveraging many tools in the AADL ecosystem</a:t>
+            </a:r>
+          </a:p>
+          <a:p>
+            <a:endParaRPr lang="en-US" dirty="0">
+              <a:latin typeface="Tahoma" panose="020B0604030504040204" pitchFamily="34" charset="0"/>
+              <a:ea typeface="Tahoma" panose="020B0604030504040204" pitchFamily="34" charset="0"/>
+              <a:cs typeface="Tahoma" panose="020B0604030504040204" pitchFamily="34" charset="0"/>
+            </a:endParaRPr>
+          </a:p>
+          <a:p>
+            <a:r>
+              <a:rPr lang="en-US" dirty="0">
+                <a:latin typeface="Tahoma" panose="020B0604030504040204" pitchFamily="34" charset="0"/>
+                <a:ea typeface="Tahoma" panose="020B0604030504040204" pitchFamily="34" charset="0"/>
+                <a:cs typeface="Tahoma" panose="020B0604030504040204" pitchFamily="34" charset="0"/>
+              </a:rPr>
+              <a:t>Development of component application logic in multiple languages include C and Slang (a safety-critical system of Scala with a contract verification framework, which can be translated to C)</a:t>
+            </a:r>
+          </a:p>
+          <a:p>
+            <a:endParaRPr lang="en-US" dirty="0">
+              <a:latin typeface="Tahoma" panose="020B0604030504040204" pitchFamily="34" charset="0"/>
+              <a:ea typeface="Tahoma" panose="020B0604030504040204" pitchFamily="34" charset="0"/>
+              <a:cs typeface="Tahoma" panose="020B0604030504040204" pitchFamily="34" charset="0"/>
+            </a:endParaRPr>
+          </a:p>
+          <a:p>
+            <a:r>
+              <a:rPr lang="en-US" dirty="0">
+                <a:latin typeface="Tahoma" panose="020B0604030504040204" pitchFamily="34" charset="0"/>
+                <a:ea typeface="Tahoma" panose="020B0604030504040204" pitchFamily="34" charset="0"/>
+                <a:cs typeface="Tahoma" panose="020B0604030504040204" pitchFamily="34" charset="0"/>
+              </a:rPr>
+              <a:t>Deployments on multiple platforms including seL4 verified microkernel.</a:t>
+            </a:r>
+          </a:p>
+          <a:p>
+            <a:endParaRPr lang="en-US" dirty="0">
+              <a:latin typeface="Tahoma" panose="020B0604030504040204" pitchFamily="34" charset="0"/>
+              <a:ea typeface="Tahoma" panose="020B0604030504040204" pitchFamily="34" charset="0"/>
+              <a:cs typeface="Tahoma" panose="020B0604030504040204" pitchFamily="34" charset="0"/>
+            </a:endParaRPr>
+          </a:p>
+        </p:txBody>
+      </p:sp>
+      <p:sp>
+        <p:nvSpPr>
+          <p:cNvPr id="4" name="Slide Number Placeholder 3">
+            <a:extLst>
+              <a:ext uri="{FF2B5EF4-FFF2-40B4-BE49-F238E27FC236}">
+                <a16:creationId xmlns:a16="http://schemas.microsoft.com/office/drawing/2014/main" id="{9C2F3F60-2487-07EE-6EFF-529AFE07725A}"/>
+              </a:ext>
+            </a:extLst>
+          </p:cNvPr>
+          <p:cNvSpPr>
+            <a:spLocks noGrp="1"/>
+          </p:cNvSpPr>
+          <p:nvPr>
+            <p:ph type="sldNum" sz="quarter" idx="5"/>
+          </p:nvPr>
+        </p:nvSpPr>
+        <p:spPr/>
+        <p:txBody>
+          <a:bodyPr/>
+          <a:lstStyle/>
+          <a:p>
+            <a:pPr>
+              <a:defRPr/>
+            </a:pPr>
+            <a:fld id="{2BFE2475-28EF-9A44-97D3-D2287C00B1B1}" type="slidenum">
+              <a:rPr lang="en-US" smtClean="0"/>
+              <a:pPr>
+                <a:defRPr/>
+              </a:pPr>
+              <a:t>3</a:t>
+            </a:fld>
+            <a:endParaRPr lang="en-US"/>
+          </a:p>
+        </p:txBody>
+      </p:sp>
+    </p:spTree>
+    <p:extLst>
+      <p:ext uri="{BB962C8B-B14F-4D97-AF65-F5344CB8AC3E}">
+        <p14:creationId xmlns:p14="http://schemas.microsoft.com/office/powerpoint/2010/main" val="1425047767"/>
+      </p:ext>
+    </p:extLst>
+  </p:cSld>
+  <p:clrMapOvr>
+    <a:masterClrMapping/>
+  </p:clrMapOvr>
+</p:notes>
+</file>
+
+<file path=ppt/notesSlides/notesSlide4.xml><?xml version="1.0" encoding="utf-8"?>
+<p:notes xmlns:a="http://schemas.openxmlformats.org/drawingml/2006/main" xmlns:r="http://schemas.openxmlformats.org/officeDocument/2006/relationships" xmlns:p="http://schemas.openxmlformats.org/presentationml/2006/main">
+  <p:cSld>
+    <p:spTree>
+      <p:nvGrpSpPr>
+        <p:cNvPr id="1" name="">
+          <a:extLst>
+            <a:ext uri="{FF2B5EF4-FFF2-40B4-BE49-F238E27FC236}">
+              <a16:creationId xmlns:a16="http://schemas.microsoft.com/office/drawing/2014/main" id="{86F8DE0B-F455-87E0-7CA2-21B869C09ADE}"/>
+            </a:ext>
+          </a:extLst>
+        </p:cNvPr>
+        <p:cNvGrpSpPr/>
+        <p:nvPr/>
+      </p:nvGrpSpPr>
+      <p:grpSpPr>
+        <a:xfrm>
+          <a:off x="0" y="0"/>
+          <a:ext cx="0" cy="0"/>
+          <a:chOff x="0" y="0"/>
+          <a:chExt cx="0" cy="0"/>
+        </a:xfrm>
+      </p:grpSpPr>
+      <p:sp>
+        <p:nvSpPr>
+          <p:cNvPr id="2" name="Slide Image Placeholder 1">
+            <a:extLst>
+              <a:ext uri="{FF2B5EF4-FFF2-40B4-BE49-F238E27FC236}">
+                <a16:creationId xmlns:a16="http://schemas.microsoft.com/office/drawing/2014/main" id="{1FF44C6B-AA71-4943-970C-D6DFFDAD432D}"/>
+              </a:ext>
+            </a:extLst>
+          </p:cNvPr>
+          <p:cNvSpPr>
+            <a:spLocks noGrp="1" noRot="1" noChangeAspect="1"/>
+          </p:cNvSpPr>
+          <p:nvPr>
+            <p:ph type="sldImg"/>
+          </p:nvPr>
+        </p:nvSpPr>
+        <p:spPr/>
+      </p:sp>
+      <p:sp>
+        <p:nvSpPr>
+          <p:cNvPr id="3" name="Notes Placeholder 2">
+            <a:extLst>
+              <a:ext uri="{FF2B5EF4-FFF2-40B4-BE49-F238E27FC236}">
+                <a16:creationId xmlns:a16="http://schemas.microsoft.com/office/drawing/2014/main" id="{8913E609-4BDD-D773-4EF6-B5C068C5D78B}"/>
+              </a:ext>
+            </a:extLst>
+          </p:cNvPr>
+          <p:cNvSpPr>
+            <a:spLocks noGrp="1"/>
+          </p:cNvSpPr>
+          <p:nvPr>
+            <p:ph type="body" idx="1"/>
+          </p:nvPr>
+        </p:nvSpPr>
+        <p:spPr/>
+        <p:txBody>
+          <a:bodyPr/>
+          <a:lstStyle/>
+          <a:p>
+            <a:r>
+              <a:rPr lang="en-US" dirty="0">
+                <a:latin typeface="Tahoma" panose="020B0604030504040204" pitchFamily="34" charset="0"/>
+                <a:ea typeface="Tahoma" panose="020B0604030504040204" pitchFamily="34" charset="0"/>
+                <a:cs typeface="Tahoma" panose="020B0604030504040204" pitchFamily="34" charset="0"/>
+              </a:rPr>
+              <a:t>The framework that we will be using for this work is HAMR -- a model-driven development tool chain for high assurance embedded systems that emphasizes three layers of development:</a:t>
+            </a:r>
+          </a:p>
+          <a:p>
+            <a:endParaRPr lang="en-US" dirty="0">
+              <a:latin typeface="Tahoma" panose="020B0604030504040204" pitchFamily="34" charset="0"/>
+              <a:ea typeface="Tahoma" panose="020B0604030504040204" pitchFamily="34" charset="0"/>
+              <a:cs typeface="Tahoma" panose="020B0604030504040204" pitchFamily="34" charset="0"/>
+            </a:endParaRPr>
+          </a:p>
+          <a:p>
+            <a:r>
+              <a:rPr lang="en-US" dirty="0">
+                <a:latin typeface="Tahoma" panose="020B0604030504040204" pitchFamily="34" charset="0"/>
+                <a:ea typeface="Tahoma" panose="020B0604030504040204" pitchFamily="34" charset="0"/>
+                <a:cs typeface="Tahoma" panose="020B0604030504040204" pitchFamily="34" charset="0"/>
+              </a:rPr>
+              <a:t>Modeling, analysis and verification in the AADL modeling language, leveraging many tools in the AADL ecosystem</a:t>
+            </a:r>
+          </a:p>
+          <a:p>
+            <a:endParaRPr lang="en-US" dirty="0">
+              <a:latin typeface="Tahoma" panose="020B0604030504040204" pitchFamily="34" charset="0"/>
+              <a:ea typeface="Tahoma" panose="020B0604030504040204" pitchFamily="34" charset="0"/>
+              <a:cs typeface="Tahoma" panose="020B0604030504040204" pitchFamily="34" charset="0"/>
+            </a:endParaRPr>
+          </a:p>
+          <a:p>
+            <a:r>
+              <a:rPr lang="en-US" dirty="0">
+                <a:latin typeface="Tahoma" panose="020B0604030504040204" pitchFamily="34" charset="0"/>
+                <a:ea typeface="Tahoma" panose="020B0604030504040204" pitchFamily="34" charset="0"/>
+                <a:cs typeface="Tahoma" panose="020B0604030504040204" pitchFamily="34" charset="0"/>
+              </a:rPr>
+              <a:t>Development of component application logic in multiple languages include C and Slang (a safety-critical system of Scala with a contract verification framework, which can be translated to C)</a:t>
+            </a:r>
+          </a:p>
+          <a:p>
+            <a:endParaRPr lang="en-US" dirty="0">
+              <a:latin typeface="Tahoma" panose="020B0604030504040204" pitchFamily="34" charset="0"/>
+              <a:ea typeface="Tahoma" panose="020B0604030504040204" pitchFamily="34" charset="0"/>
+              <a:cs typeface="Tahoma" panose="020B0604030504040204" pitchFamily="34" charset="0"/>
+            </a:endParaRPr>
+          </a:p>
+          <a:p>
+            <a:r>
+              <a:rPr lang="en-US" dirty="0">
+                <a:latin typeface="Tahoma" panose="020B0604030504040204" pitchFamily="34" charset="0"/>
+                <a:ea typeface="Tahoma" panose="020B0604030504040204" pitchFamily="34" charset="0"/>
+                <a:cs typeface="Tahoma" panose="020B0604030504040204" pitchFamily="34" charset="0"/>
+              </a:rPr>
+              <a:t>Deployments on multiple platforms including seL4 verified microkernel.</a:t>
+            </a:r>
+          </a:p>
+          <a:p>
+            <a:endParaRPr lang="en-US" dirty="0">
+              <a:latin typeface="Tahoma" panose="020B0604030504040204" pitchFamily="34" charset="0"/>
+              <a:ea typeface="Tahoma" panose="020B0604030504040204" pitchFamily="34" charset="0"/>
+              <a:cs typeface="Tahoma" panose="020B0604030504040204" pitchFamily="34" charset="0"/>
+            </a:endParaRPr>
+          </a:p>
+        </p:txBody>
+      </p:sp>
+      <p:sp>
+        <p:nvSpPr>
+          <p:cNvPr id="4" name="Slide Number Placeholder 3">
+            <a:extLst>
+              <a:ext uri="{FF2B5EF4-FFF2-40B4-BE49-F238E27FC236}">
+                <a16:creationId xmlns:a16="http://schemas.microsoft.com/office/drawing/2014/main" id="{B26E5A40-C12C-5A49-85C8-4A13AA1EE04F}"/>
+              </a:ext>
+            </a:extLst>
+          </p:cNvPr>
+          <p:cNvSpPr>
+            <a:spLocks noGrp="1"/>
+          </p:cNvSpPr>
+          <p:nvPr>
+            <p:ph type="sldNum" sz="quarter" idx="5"/>
+          </p:nvPr>
+        </p:nvSpPr>
+        <p:spPr/>
+        <p:txBody>
+          <a:bodyPr/>
+          <a:lstStyle/>
+          <a:p>
+            <a:pPr>
+              <a:defRPr/>
+            </a:pPr>
+            <a:fld id="{2BFE2475-28EF-9A44-97D3-D2287C00B1B1}" type="slidenum">
+              <a:rPr lang="en-US" smtClean="0"/>
+              <a:pPr>
+                <a:defRPr/>
+              </a:pPr>
+              <a:t>4</a:t>
+            </a:fld>
+            <a:endParaRPr lang="en-US"/>
+          </a:p>
+        </p:txBody>
+      </p:sp>
+    </p:spTree>
+    <p:extLst>
+      <p:ext uri="{BB962C8B-B14F-4D97-AF65-F5344CB8AC3E}">
+        <p14:creationId xmlns:p14="http://schemas.microsoft.com/office/powerpoint/2010/main" val="1411630716"/>
+      </p:ext>
+    </p:extLst>
+  </p:cSld>
+  <p:clrMapOvr>
+    <a:masterClrMapping/>
+  </p:clrMapOvr>
+</p:notes>
+</file>
+
+<file path=ppt/notesSlides/notesSlide5.xml><?xml version="1.0" encoding="utf-8"?>
+<p:notes xmlns:a="http://schemas.openxmlformats.org/drawingml/2006/main" xmlns:r="http://schemas.openxmlformats.org/officeDocument/2006/relationships" xmlns:p="http://schemas.openxmlformats.org/presentationml/2006/main">
+  <p:cSld>
+    <p:spTree>
+      <p:nvGrpSpPr>
+        <p:cNvPr id="1" name="">
+          <a:extLst>
+            <a:ext uri="{FF2B5EF4-FFF2-40B4-BE49-F238E27FC236}">
+              <a16:creationId xmlns:a16="http://schemas.microsoft.com/office/drawing/2014/main" id="{3A9FD74B-D2B4-67AB-D358-246CE8E1F078}"/>
+            </a:ext>
+          </a:extLst>
+        </p:cNvPr>
+        <p:cNvGrpSpPr/>
+        <p:nvPr/>
+      </p:nvGrpSpPr>
+      <p:grpSpPr>
+        <a:xfrm>
+          <a:off x="0" y="0"/>
+          <a:ext cx="0" cy="0"/>
+          <a:chOff x="0" y="0"/>
+          <a:chExt cx="0" cy="0"/>
+        </a:xfrm>
+      </p:grpSpPr>
+      <p:sp>
+        <p:nvSpPr>
+          <p:cNvPr id="2" name="Slide Image Placeholder 1">
+            <a:extLst>
+              <a:ext uri="{FF2B5EF4-FFF2-40B4-BE49-F238E27FC236}">
+                <a16:creationId xmlns:a16="http://schemas.microsoft.com/office/drawing/2014/main" id="{D540A8D0-8C46-2EDA-DAD9-22DF89C52F33}"/>
+              </a:ext>
+            </a:extLst>
+          </p:cNvPr>
+          <p:cNvSpPr>
+            <a:spLocks noGrp="1" noRot="1" noChangeAspect="1"/>
+          </p:cNvSpPr>
+          <p:nvPr>
+            <p:ph type="sldImg"/>
+          </p:nvPr>
+        </p:nvSpPr>
+        <p:spPr/>
+      </p:sp>
+      <p:sp>
+        <p:nvSpPr>
+          <p:cNvPr id="3" name="Notes Placeholder 2">
+            <a:extLst>
+              <a:ext uri="{FF2B5EF4-FFF2-40B4-BE49-F238E27FC236}">
+                <a16:creationId xmlns:a16="http://schemas.microsoft.com/office/drawing/2014/main" id="{FCCD86AD-E501-1450-CE64-EBBA6E66C0CA}"/>
+              </a:ext>
+            </a:extLst>
+          </p:cNvPr>
+          <p:cNvSpPr>
+            <a:spLocks noGrp="1"/>
+          </p:cNvSpPr>
+          <p:nvPr>
+            <p:ph type="body" idx="1"/>
+          </p:nvPr>
+        </p:nvSpPr>
+        <p:spPr/>
+        <p:txBody>
+          <a:bodyPr/>
+          <a:lstStyle/>
+          <a:p>
+            <a:r>
+              <a:rPr lang="en-US" dirty="0">
+                <a:latin typeface="Tahoma" panose="020B0604030504040204" pitchFamily="34" charset="0"/>
+                <a:ea typeface="Tahoma" panose="020B0604030504040204" pitchFamily="34" charset="0"/>
+                <a:cs typeface="Tahoma" panose="020B0604030504040204" pitchFamily="34" charset="0"/>
+              </a:rPr>
+              <a:t>The framework that we will be using for this work is HAMR -- a model-driven development tool chain for high assurance embedded systems that emphasizes three layers of development:</a:t>
+            </a:r>
+          </a:p>
+          <a:p>
+            <a:endParaRPr lang="en-US" dirty="0">
+              <a:latin typeface="Tahoma" panose="020B0604030504040204" pitchFamily="34" charset="0"/>
+              <a:ea typeface="Tahoma" panose="020B0604030504040204" pitchFamily="34" charset="0"/>
+              <a:cs typeface="Tahoma" panose="020B0604030504040204" pitchFamily="34" charset="0"/>
+            </a:endParaRPr>
+          </a:p>
+          <a:p>
+            <a:r>
+              <a:rPr lang="en-US" dirty="0">
+                <a:latin typeface="Tahoma" panose="020B0604030504040204" pitchFamily="34" charset="0"/>
+                <a:ea typeface="Tahoma" panose="020B0604030504040204" pitchFamily="34" charset="0"/>
+                <a:cs typeface="Tahoma" panose="020B0604030504040204" pitchFamily="34" charset="0"/>
+              </a:rPr>
+              <a:t>Modeling, analysis and verification in the AADL modeling language, leveraging many tools in the AADL ecosystem</a:t>
+            </a:r>
+          </a:p>
+          <a:p>
+            <a:endParaRPr lang="en-US" dirty="0">
+              <a:latin typeface="Tahoma" panose="020B0604030504040204" pitchFamily="34" charset="0"/>
+              <a:ea typeface="Tahoma" panose="020B0604030504040204" pitchFamily="34" charset="0"/>
+              <a:cs typeface="Tahoma" panose="020B0604030504040204" pitchFamily="34" charset="0"/>
+            </a:endParaRPr>
+          </a:p>
+          <a:p>
+            <a:r>
+              <a:rPr lang="en-US" dirty="0">
+                <a:latin typeface="Tahoma" panose="020B0604030504040204" pitchFamily="34" charset="0"/>
+                <a:ea typeface="Tahoma" panose="020B0604030504040204" pitchFamily="34" charset="0"/>
+                <a:cs typeface="Tahoma" panose="020B0604030504040204" pitchFamily="34" charset="0"/>
+              </a:rPr>
+              <a:t>Development of component application logic in multiple languages include C and Slang (a safety-critical system of Scala with a contract verification framework, which can be translated to C)</a:t>
+            </a:r>
+          </a:p>
+          <a:p>
+            <a:endParaRPr lang="en-US" dirty="0">
+              <a:latin typeface="Tahoma" panose="020B0604030504040204" pitchFamily="34" charset="0"/>
+              <a:ea typeface="Tahoma" panose="020B0604030504040204" pitchFamily="34" charset="0"/>
+              <a:cs typeface="Tahoma" panose="020B0604030504040204" pitchFamily="34" charset="0"/>
+            </a:endParaRPr>
+          </a:p>
+          <a:p>
+            <a:r>
+              <a:rPr lang="en-US" dirty="0">
+                <a:latin typeface="Tahoma" panose="020B0604030504040204" pitchFamily="34" charset="0"/>
+                <a:ea typeface="Tahoma" panose="020B0604030504040204" pitchFamily="34" charset="0"/>
+                <a:cs typeface="Tahoma" panose="020B0604030504040204" pitchFamily="34" charset="0"/>
+              </a:rPr>
+              <a:t>Deployments on multiple platforms including seL4 verified microkernel.</a:t>
+            </a:r>
+          </a:p>
+          <a:p>
+            <a:endParaRPr lang="en-US" dirty="0">
+              <a:latin typeface="Tahoma" panose="020B0604030504040204" pitchFamily="34" charset="0"/>
+              <a:ea typeface="Tahoma" panose="020B0604030504040204" pitchFamily="34" charset="0"/>
+              <a:cs typeface="Tahoma" panose="020B0604030504040204" pitchFamily="34" charset="0"/>
+            </a:endParaRPr>
+          </a:p>
+        </p:txBody>
+      </p:sp>
+      <p:sp>
+        <p:nvSpPr>
+          <p:cNvPr id="4" name="Slide Number Placeholder 3">
+            <a:extLst>
+              <a:ext uri="{FF2B5EF4-FFF2-40B4-BE49-F238E27FC236}">
+                <a16:creationId xmlns:a16="http://schemas.microsoft.com/office/drawing/2014/main" id="{77440BBB-DF38-9506-CF16-402792AF980A}"/>
+              </a:ext>
+            </a:extLst>
+          </p:cNvPr>
+          <p:cNvSpPr>
+            <a:spLocks noGrp="1"/>
+          </p:cNvSpPr>
+          <p:nvPr>
+            <p:ph type="sldNum" sz="quarter" idx="5"/>
+          </p:nvPr>
+        </p:nvSpPr>
+        <p:spPr/>
+        <p:txBody>
+          <a:bodyPr/>
+          <a:lstStyle/>
+          <a:p>
+            <a:pPr>
+              <a:defRPr/>
+            </a:pPr>
+            <a:fld id="{2BFE2475-28EF-9A44-97D3-D2287C00B1B1}" type="slidenum">
+              <a:rPr lang="en-US" smtClean="0"/>
+              <a:pPr>
+                <a:defRPr/>
+              </a:pPr>
+              <a:t>5</a:t>
+            </a:fld>
+            <a:endParaRPr lang="en-US"/>
+          </a:p>
+        </p:txBody>
+      </p:sp>
+    </p:spTree>
+    <p:extLst>
+      <p:ext uri="{BB962C8B-B14F-4D97-AF65-F5344CB8AC3E}">
+        <p14:creationId xmlns:p14="http://schemas.microsoft.com/office/powerpoint/2010/main" val="455398068"/>
       </p:ext>
     </p:extLst>
   </p:cSld>
@@ -4429,7 +4969,7 @@
             </a:br>
             <a:r>
               <a:rPr lang="en-US" sz="4000" dirty="0"/>
-              <a:t>Proof and Rewriting</a:t>
+              <a:t>Proof and Structure</a:t>
             </a:r>
             <a:endParaRPr lang="en-US" sz="5400" dirty="0"/>
           </a:p>
@@ -4856,14 +5396,13 @@
           <a:lstStyle/>
           <a:p>
             <a:r>
-              <a:rPr lang="en-US" sz="3600" dirty="0"/>
-              <a:t>Proof in </a:t>
-            </a:r>
-            <a:r>
               <a:rPr lang="en-US" sz="3600" dirty="0" err="1"/>
               <a:t>Logika</a:t>
             </a:r>
-            <a:endParaRPr lang="en-US" sz="3600" dirty="0"/>
+            <a:r>
+              <a:rPr lang="en-US" sz="3600" dirty="0"/>
+              <a:t> Proof-Style</a:t>
+            </a:r>
           </a:p>
         </p:txBody>
       </p:sp>
@@ -4954,10 +5493,1228 @@
           </a:p>
         </p:txBody>
       </p:sp>
+      <p:sp>
+        <p:nvSpPr>
+          <p:cNvPr id="4" name="TextBox 3">
+            <a:extLst>
+              <a:ext uri="{FF2B5EF4-FFF2-40B4-BE49-F238E27FC236}">
+                <a16:creationId xmlns:a16="http://schemas.microsoft.com/office/drawing/2014/main" id="{98511B4E-5DFC-4E52-D075-19B31741EF65}"/>
+              </a:ext>
+            </a:extLst>
+          </p:cNvPr>
+          <p:cNvSpPr txBox="1"/>
+          <p:nvPr/>
+        </p:nvSpPr>
+        <p:spPr>
+          <a:xfrm>
+            <a:off x="533400" y="1600200"/>
+            <a:ext cx="7391400" cy="3416320"/>
+          </a:xfrm>
+          <a:prstGeom prst="rect">
+            <a:avLst/>
+          </a:prstGeom>
+          <a:noFill/>
+        </p:spPr>
+        <p:txBody>
+          <a:bodyPr wrap="square" rtlCol="0">
+            <a:spAutoFit/>
+          </a:bodyPr>
+          <a:lstStyle/>
+          <a:p>
+            <a:pPr marL="285750" indent="-285750">
+              <a:buFont typeface="Arial" panose="020B0604020202020204" pitchFamily="34" charset="0"/>
+              <a:buChar char="•"/>
+            </a:pPr>
+            <a:r>
+              <a:rPr lang="en-GB" sz="1800" dirty="0" err="1"/>
+              <a:t>Logika</a:t>
+            </a:r>
+            <a:r>
+              <a:rPr lang="en-GB" sz="1800" dirty="0"/>
+              <a:t> accepts proofs in natural deduction style</a:t>
+            </a:r>
+          </a:p>
+          <a:p>
+            <a:pPr marL="285750" indent="-285750">
+              <a:buFont typeface="Arial" panose="020B0604020202020204" pitchFamily="34" charset="0"/>
+              <a:buChar char="•"/>
+            </a:pPr>
+            <a:r>
+              <a:rPr lang="en-GB" sz="1800" dirty="0"/>
+              <a:t>Proofs are linear sequences of facts</a:t>
+            </a:r>
+          </a:p>
+          <a:p>
+            <a:pPr marL="285750" indent="-285750">
+              <a:buFont typeface="Arial" panose="020B0604020202020204" pitchFamily="34" charset="0"/>
+              <a:buChar char="•"/>
+            </a:pPr>
+            <a:r>
+              <a:rPr lang="en-GB" sz="1800" dirty="0" err="1"/>
+              <a:t>Subproofs</a:t>
+            </a:r>
+            <a:r>
+              <a:rPr lang="en-GB" sz="1800" dirty="0"/>
+              <a:t> may begin with</a:t>
+            </a:r>
+          </a:p>
+          <a:p>
+            <a:pPr marL="742950" lvl="1" indent="-285750">
+              <a:buFont typeface="Arial" panose="020B0604020202020204" pitchFamily="34" charset="0"/>
+              <a:buChar char="•"/>
+            </a:pPr>
+            <a:r>
+              <a:rPr lang="en-GB" sz="1800" dirty="0"/>
+              <a:t>an assumption (</a:t>
+            </a:r>
+            <a:r>
+              <a:rPr lang="en-GB" sz="1800" dirty="0">
+                <a:solidFill>
+                  <a:srgbClr val="8922FD"/>
+                </a:solidFill>
+                <a:latin typeface="Menlo" panose="020B0609030804020204" pitchFamily="49" charset="0"/>
+                <a:ea typeface="Menlo" panose="020B0609030804020204" pitchFamily="49" charset="0"/>
+                <a:cs typeface="Menlo" panose="020B0609030804020204" pitchFamily="49" charset="0"/>
+              </a:rPr>
+              <a:t>Assume</a:t>
+            </a:r>
+            <a:r>
+              <a:rPr lang="en-GB" sz="1800" dirty="0"/>
+              <a:t>) that must be </a:t>
+            </a:r>
+            <a:r>
+              <a:rPr lang="en-GB" sz="1800" b="1" dirty="0"/>
+              <a:t>discharged</a:t>
+            </a:r>
+            <a:br>
+              <a:rPr lang="en-GB" sz="1800" dirty="0"/>
+            </a:br>
+            <a:r>
+              <a:rPr lang="en-GB" sz="1800" dirty="0"/>
+              <a:t>(implication proofs)</a:t>
+            </a:r>
+          </a:p>
+          <a:p>
+            <a:pPr marL="742950" lvl="1" indent="-285750">
+              <a:buFont typeface="Arial" panose="020B0604020202020204" pitchFamily="34" charset="0"/>
+              <a:buChar char="•"/>
+            </a:pPr>
+            <a:r>
+              <a:rPr lang="en-GB" sz="1800" dirty="0"/>
+              <a:t>a new variable (</a:t>
+            </a:r>
+            <a:r>
+              <a:rPr lang="en-GB" sz="1800" dirty="0">
+                <a:solidFill>
+                  <a:srgbClr val="8922FD"/>
+                </a:solidFill>
+                <a:latin typeface="Menlo" panose="020B0609030804020204" pitchFamily="49" charset="0"/>
+                <a:ea typeface="Menlo" panose="020B0609030804020204" pitchFamily="49" charset="0"/>
+                <a:cs typeface="Menlo" panose="020B0609030804020204" pitchFamily="49" charset="0"/>
+              </a:rPr>
+              <a:t>Let</a:t>
+            </a:r>
+            <a:r>
+              <a:rPr lang="en-GB" sz="1800" dirty="0"/>
+              <a:t>) that must be </a:t>
+            </a:r>
+            <a:r>
+              <a:rPr lang="en-GB" sz="1800" b="1" dirty="0"/>
+              <a:t>discharged</a:t>
+            </a:r>
+            <a:br>
+              <a:rPr lang="en-GB" sz="1800" dirty="0"/>
+            </a:br>
+            <a:r>
+              <a:rPr lang="en-GB" sz="1800" dirty="0"/>
+              <a:t>(universal quantification proofs)</a:t>
+            </a:r>
+          </a:p>
+          <a:p>
+            <a:pPr marL="285750" indent="-285750">
+              <a:buFont typeface="Arial" panose="020B0604020202020204" pitchFamily="34" charset="0"/>
+              <a:buChar char="•"/>
+            </a:pPr>
+            <a:r>
+              <a:rPr lang="en-GB" sz="1800" dirty="0" err="1"/>
+              <a:t>Subproofs</a:t>
+            </a:r>
+            <a:r>
+              <a:rPr lang="en-GB" sz="1800" dirty="0"/>
+              <a:t> can be provided for assertions (</a:t>
+            </a:r>
+            <a:r>
+              <a:rPr lang="en-GB" sz="1800" dirty="0">
+                <a:solidFill>
+                  <a:srgbClr val="8922FD"/>
+                </a:solidFill>
+                <a:latin typeface="Menlo" panose="020B0609030804020204" pitchFamily="49" charset="0"/>
+                <a:ea typeface="Menlo" panose="020B0609030804020204" pitchFamily="49" charset="0"/>
+                <a:cs typeface="Menlo" panose="020B0609030804020204" pitchFamily="49" charset="0"/>
+              </a:rPr>
+              <a:t>Assert</a:t>
+            </a:r>
+            <a:r>
+              <a:rPr lang="en-GB" sz="1800" dirty="0"/>
+              <a:t>)</a:t>
+            </a:r>
+            <a:br>
+              <a:rPr lang="en-GB" sz="1800" dirty="0"/>
+            </a:br>
+            <a:r>
+              <a:rPr lang="en-GB" sz="1800" dirty="0"/>
+              <a:t>(local lemmas, cut rule)</a:t>
+            </a:r>
+          </a:p>
+          <a:p>
+            <a:pPr marL="285750" indent="-285750">
+              <a:buFont typeface="Arial" panose="020B0604020202020204" pitchFamily="34" charset="0"/>
+              <a:buChar char="•"/>
+            </a:pPr>
+            <a:r>
+              <a:rPr lang="en-GB" sz="1800" dirty="0"/>
+              <a:t>In practice, such proofs look similar to structured programs</a:t>
+            </a:r>
+          </a:p>
+          <a:p>
+            <a:pPr marL="285750" indent="-285750">
+              <a:buFont typeface="Arial" panose="020B0604020202020204" pitchFamily="34" charset="0"/>
+              <a:buChar char="•"/>
+            </a:pPr>
+            <a:r>
+              <a:rPr lang="en-GB" sz="1800" dirty="0"/>
+              <a:t>There is a close analogy between natural deduction and functional programming</a:t>
+            </a:r>
+          </a:p>
+        </p:txBody>
+      </p:sp>
     </p:spTree>
     <p:extLst>
       <p:ext uri="{BB962C8B-B14F-4D97-AF65-F5344CB8AC3E}">
         <p14:creationId xmlns:p14="http://schemas.microsoft.com/office/powerpoint/2010/main" val="974532288"/>
+      </p:ext>
+    </p:extLst>
+  </p:cSld>
+  <p:clrMapOvr>
+    <a:masterClrMapping/>
+  </p:clrMapOvr>
+</p:sld>
+</file>
+
+<file path=ppt/slides/slide3.xml><?xml version="1.0" encoding="utf-8"?>
+<p:sld xmlns:a="http://schemas.openxmlformats.org/drawingml/2006/main" xmlns:r="http://schemas.openxmlformats.org/officeDocument/2006/relationships" xmlns:p="http://schemas.openxmlformats.org/presentationml/2006/main">
+  <p:cSld>
+    <p:spTree>
+      <p:nvGrpSpPr>
+        <p:cNvPr id="1" name="">
+          <a:extLst>
+            <a:ext uri="{FF2B5EF4-FFF2-40B4-BE49-F238E27FC236}">
+              <a16:creationId xmlns:a16="http://schemas.microsoft.com/office/drawing/2014/main" id="{CAAB1902-EC9B-9428-0560-214CCF4B60EC}"/>
+            </a:ext>
+          </a:extLst>
+        </p:cNvPr>
+        <p:cNvGrpSpPr/>
+        <p:nvPr/>
+      </p:nvGrpSpPr>
+      <p:grpSpPr>
+        <a:xfrm>
+          <a:off x="0" y="0"/>
+          <a:ext cx="0" cy="0"/>
+          <a:chOff x="0" y="0"/>
+          <a:chExt cx="0" cy="0"/>
+        </a:xfrm>
+      </p:grpSpPr>
+      <p:sp>
+        <p:nvSpPr>
+          <p:cNvPr id="2" name="Title 1">
+            <a:extLst>
+              <a:ext uri="{FF2B5EF4-FFF2-40B4-BE49-F238E27FC236}">
+                <a16:creationId xmlns:a16="http://schemas.microsoft.com/office/drawing/2014/main" id="{18F2C4EB-123B-4F26-001A-A10E8A61FCF9}"/>
+              </a:ext>
+            </a:extLst>
+          </p:cNvPr>
+          <p:cNvSpPr>
+            <a:spLocks noGrp="1"/>
+          </p:cNvSpPr>
+          <p:nvPr>
+            <p:ph type="title"/>
+          </p:nvPr>
+        </p:nvSpPr>
+        <p:spPr/>
+        <p:txBody>
+          <a:bodyPr/>
+          <a:lstStyle/>
+          <a:p>
+            <a:r>
+              <a:rPr lang="en-US" sz="3600" dirty="0"/>
+              <a:t>Structured Proof in </a:t>
+            </a:r>
+            <a:r>
+              <a:rPr lang="en-US" sz="3600" dirty="0" err="1"/>
+              <a:t>Logika</a:t>
+            </a:r>
+            <a:endParaRPr lang="en-US" sz="3600" dirty="0"/>
+          </a:p>
+        </p:txBody>
+      </p:sp>
+      <p:sp>
+        <p:nvSpPr>
+          <p:cNvPr id="128" name="Slide Number Placeholder 127">
+            <a:extLst>
+              <a:ext uri="{FF2B5EF4-FFF2-40B4-BE49-F238E27FC236}">
+                <a16:creationId xmlns:a16="http://schemas.microsoft.com/office/drawing/2014/main" id="{651B9536-CE76-DC8C-3E6B-34B5AC8B78EA}"/>
+              </a:ext>
+            </a:extLst>
+          </p:cNvPr>
+          <p:cNvSpPr>
+            <a:spLocks noGrp="1"/>
+          </p:cNvSpPr>
+          <p:nvPr>
+            <p:ph type="sldNum" sz="quarter" idx="11"/>
+          </p:nvPr>
+        </p:nvSpPr>
+        <p:spPr/>
+        <p:txBody>
+          <a:bodyPr/>
+          <a:lstStyle/>
+          <a:p>
+            <a:pPr>
+              <a:defRPr/>
+            </a:pPr>
+            <a:fld id="{6E0AA622-F4CE-604D-A669-CD3D12FC535C}" type="slidenum">
+              <a:rPr lang="en-US" smtClean="0"/>
+              <a:pPr>
+                <a:defRPr/>
+              </a:pPr>
+              <a:t>3</a:t>
+            </a:fld>
+            <a:endParaRPr lang="en-US" dirty="0"/>
+          </a:p>
+        </p:txBody>
+      </p:sp>
+      <p:sp>
+        <p:nvSpPr>
+          <p:cNvPr id="3" name="TextBox 2">
+            <a:extLst>
+              <a:ext uri="{FF2B5EF4-FFF2-40B4-BE49-F238E27FC236}">
+                <a16:creationId xmlns:a16="http://schemas.microsoft.com/office/drawing/2014/main" id="{D308DE41-1805-D51A-CDC8-3C595827CF03}"/>
+              </a:ext>
+            </a:extLst>
+          </p:cNvPr>
+          <p:cNvSpPr txBox="1"/>
+          <p:nvPr/>
+        </p:nvSpPr>
+        <p:spPr>
+          <a:xfrm>
+            <a:off x="381000" y="1158925"/>
+            <a:ext cx="8016766" cy="338554"/>
+          </a:xfrm>
+          <a:prstGeom prst="rect">
+            <a:avLst/>
+          </a:prstGeom>
+          <a:gradFill flip="none" rotWithShape="1">
+            <a:gsLst>
+              <a:gs pos="0">
+                <a:schemeClr val="bg1"/>
+              </a:gs>
+              <a:gs pos="74000">
+                <a:srgbClr val="FFE267"/>
+              </a:gs>
+              <a:gs pos="83000">
+                <a:srgbClr val="FFE267"/>
+              </a:gs>
+              <a:gs pos="100000">
+                <a:srgbClr val="FFE267"/>
+              </a:gs>
+            </a:gsLst>
+            <a:lin ang="10800000" scaled="1"/>
+            <a:tileRect/>
+          </a:gradFill>
+        </p:spPr>
+        <p:txBody>
+          <a:bodyPr wrap="square" rtlCol="0">
+            <a:spAutoFit/>
+          </a:bodyPr>
+          <a:lstStyle/>
+          <a:p>
+            <a:r>
+              <a:rPr lang="en-US" sz="1600" dirty="0"/>
+              <a:t>Quantifier proofs with </a:t>
+            </a:r>
+            <a:r>
+              <a:rPr lang="en-US" sz="1600" dirty="0">
+                <a:solidFill>
+                  <a:srgbClr val="8922FD"/>
+                </a:solidFill>
+                <a:latin typeface="Menlo" panose="020B0609030804020204" pitchFamily="49" charset="0"/>
+                <a:ea typeface="Menlo" panose="020B0609030804020204" pitchFamily="49" charset="0"/>
+                <a:cs typeface="Menlo" panose="020B0609030804020204" pitchFamily="49" charset="0"/>
+              </a:rPr>
+              <a:t>Assume</a:t>
+            </a:r>
+            <a:r>
+              <a:rPr lang="en-US" sz="1600" dirty="0"/>
+              <a:t> and </a:t>
+            </a:r>
+            <a:r>
+              <a:rPr lang="en-US" sz="1600" dirty="0">
+                <a:solidFill>
+                  <a:srgbClr val="8922FD"/>
+                </a:solidFill>
+                <a:latin typeface="Menlo" panose="020B0609030804020204" pitchFamily="49" charset="0"/>
+                <a:ea typeface="Menlo" panose="020B0609030804020204" pitchFamily="49" charset="0"/>
+                <a:cs typeface="Menlo" panose="020B0609030804020204" pitchFamily="49" charset="0"/>
+              </a:rPr>
+              <a:t>Let</a:t>
+            </a:r>
+          </a:p>
+        </p:txBody>
+      </p:sp>
+      <p:pic>
+        <p:nvPicPr>
+          <p:cNvPr id="6" name="Picture 5" descr="A screenshot of a computer program&#10;&#10;Description automatically generated">
+            <a:extLst>
+              <a:ext uri="{FF2B5EF4-FFF2-40B4-BE49-F238E27FC236}">
+                <a16:creationId xmlns:a16="http://schemas.microsoft.com/office/drawing/2014/main" id="{ABF3183A-AB17-2E77-22A0-85E695BD4100}"/>
+              </a:ext>
+            </a:extLst>
+          </p:cNvPr>
+          <p:cNvPicPr>
+            <a:picLocks noChangeAspect="1"/>
+          </p:cNvPicPr>
+          <p:nvPr/>
+        </p:nvPicPr>
+        <p:blipFill>
+          <a:blip r:embed="rId3"/>
+          <a:stretch>
+            <a:fillRect/>
+          </a:stretch>
+        </p:blipFill>
+        <p:spPr>
+          <a:xfrm>
+            <a:off x="627077" y="1513404"/>
+            <a:ext cx="8046041" cy="5268396"/>
+          </a:xfrm>
+          <a:prstGeom prst="rect">
+            <a:avLst/>
+          </a:prstGeom>
+        </p:spPr>
+      </p:pic>
+      <p:sp>
+        <p:nvSpPr>
+          <p:cNvPr id="7" name="TextBox 6">
+            <a:extLst>
+              <a:ext uri="{FF2B5EF4-FFF2-40B4-BE49-F238E27FC236}">
+                <a16:creationId xmlns:a16="http://schemas.microsoft.com/office/drawing/2014/main" id="{D8994952-DB74-2992-9B38-344FCFAE9052}"/>
+              </a:ext>
+            </a:extLst>
+          </p:cNvPr>
+          <p:cNvSpPr txBox="1"/>
+          <p:nvPr/>
+        </p:nvSpPr>
+        <p:spPr>
+          <a:xfrm>
+            <a:off x="4384246" y="2362200"/>
+            <a:ext cx="4607354" cy="3416320"/>
+          </a:xfrm>
+          <a:prstGeom prst="rect">
+            <a:avLst/>
+          </a:prstGeom>
+          <a:gradFill flip="none" rotWithShape="1">
+            <a:gsLst>
+              <a:gs pos="0">
+                <a:schemeClr val="accent2">
+                  <a:lumMod val="5000"/>
+                  <a:lumOff val="95000"/>
+                </a:schemeClr>
+              </a:gs>
+              <a:gs pos="74000">
+                <a:schemeClr val="accent2">
+                  <a:lumMod val="45000"/>
+                  <a:lumOff val="55000"/>
+                </a:schemeClr>
+              </a:gs>
+              <a:gs pos="83000">
+                <a:schemeClr val="accent2">
+                  <a:lumMod val="45000"/>
+                  <a:lumOff val="55000"/>
+                </a:schemeClr>
+              </a:gs>
+              <a:gs pos="100000">
+                <a:schemeClr val="accent2">
+                  <a:lumMod val="30000"/>
+                  <a:lumOff val="70000"/>
+                </a:schemeClr>
+              </a:gs>
+            </a:gsLst>
+            <a:lin ang="10800000" scaled="1"/>
+            <a:tileRect/>
+          </a:gradFill>
+        </p:spPr>
+        <p:txBody>
+          <a:bodyPr wrap="square" rtlCol="0">
+            <a:spAutoFit/>
+          </a:bodyPr>
+          <a:lstStyle/>
+          <a:p>
+            <a:pPr marL="285750" indent="-285750">
+              <a:buFont typeface="Arial" panose="020B0604020202020204" pitchFamily="34" charset="0"/>
+              <a:buChar char="•"/>
+            </a:pPr>
+            <a:r>
+              <a:rPr lang="en-GB" sz="1800" dirty="0"/>
+              <a:t>The first </a:t>
+            </a:r>
+            <a:r>
+              <a:rPr lang="en-GB" sz="1800" dirty="0">
+                <a:solidFill>
+                  <a:srgbClr val="8922FD"/>
+                </a:solidFill>
+                <a:latin typeface="Menlo" panose="020B0609030804020204" pitchFamily="49" charset="0"/>
+                <a:ea typeface="Menlo" panose="020B0609030804020204" pitchFamily="49" charset="0"/>
+                <a:cs typeface="Menlo" panose="020B0609030804020204" pitchFamily="49" charset="0"/>
+              </a:rPr>
+              <a:t>Let</a:t>
+            </a:r>
+            <a:r>
+              <a:rPr lang="en-GB" sz="1800" dirty="0"/>
+              <a:t>/</a:t>
+            </a:r>
+            <a:r>
+              <a:rPr lang="en-GB" sz="1800" dirty="0">
+                <a:solidFill>
+                  <a:srgbClr val="8922FD"/>
+                </a:solidFill>
+                <a:latin typeface="Menlo" panose="020B0609030804020204" pitchFamily="49" charset="0"/>
+                <a:ea typeface="Menlo" panose="020B0609030804020204" pitchFamily="49" charset="0"/>
+                <a:cs typeface="Menlo" panose="020B0609030804020204" pitchFamily="49" charset="0"/>
+              </a:rPr>
+              <a:t>Assume</a:t>
+            </a:r>
+            <a:r>
+              <a:rPr lang="en-GB" sz="1800" dirty="0"/>
+              <a:t> pair (</a:t>
+            </a:r>
+            <a:r>
+              <a:rPr lang="en-GB" sz="1800" dirty="0">
+                <a:solidFill>
+                  <a:srgbClr val="0070C0"/>
+                </a:solidFill>
+              </a:rPr>
+              <a:t>4</a:t>
+            </a:r>
+            <a:r>
+              <a:rPr lang="en-GB" sz="1800" dirty="0"/>
+              <a:t>/</a:t>
+            </a:r>
+            <a:r>
+              <a:rPr lang="en-GB" sz="1800" dirty="0">
+                <a:solidFill>
+                  <a:srgbClr val="0070C0"/>
+                </a:solidFill>
+              </a:rPr>
+              <a:t>5</a:t>
+            </a:r>
+            <a:r>
+              <a:rPr lang="en-GB" sz="1800" dirty="0"/>
+              <a:t>) introduces the abbreviation </a:t>
+            </a:r>
+            <a:r>
+              <a:rPr lang="en-GB" sz="1800" dirty="0" err="1"/>
+              <a:t>seqx</a:t>
+            </a:r>
+            <a:endParaRPr lang="en-GB" sz="1800" dirty="0"/>
+          </a:p>
+          <a:p>
+            <a:pPr marL="285750" indent="-285750">
+              <a:buFont typeface="Arial" panose="020B0604020202020204" pitchFamily="34" charset="0"/>
+              <a:buChar char="•"/>
+            </a:pPr>
+            <a:r>
+              <a:rPr lang="en-GB" sz="1800" dirty="0"/>
+              <a:t>The second </a:t>
+            </a:r>
+            <a:r>
+              <a:rPr lang="en-GB" sz="1800" dirty="0">
+                <a:solidFill>
+                  <a:srgbClr val="8922FD"/>
+                </a:solidFill>
+                <a:latin typeface="Menlo" panose="020B0609030804020204" pitchFamily="49" charset="0"/>
+                <a:ea typeface="Menlo" panose="020B0609030804020204" pitchFamily="49" charset="0"/>
+                <a:cs typeface="Menlo" panose="020B0609030804020204" pitchFamily="49" charset="0"/>
+              </a:rPr>
+              <a:t>Let</a:t>
+            </a:r>
+            <a:r>
+              <a:rPr lang="en-GB" sz="1800" dirty="0"/>
+              <a:t>/</a:t>
+            </a:r>
+            <a:r>
+              <a:rPr lang="en-GB" sz="1800" dirty="0">
+                <a:solidFill>
+                  <a:srgbClr val="8922FD"/>
+                </a:solidFill>
+                <a:latin typeface="Menlo" panose="020B0609030804020204" pitchFamily="49" charset="0"/>
+                <a:ea typeface="Menlo" panose="020B0609030804020204" pitchFamily="49" charset="0"/>
+                <a:cs typeface="Menlo" panose="020B0609030804020204" pitchFamily="49" charset="0"/>
+              </a:rPr>
+              <a:t>Assume</a:t>
+            </a:r>
+            <a:r>
+              <a:rPr lang="en-GB" sz="1800" dirty="0"/>
+              <a:t> pair (</a:t>
+            </a:r>
+            <a:r>
+              <a:rPr lang="en-GB" sz="1800" dirty="0">
+                <a:solidFill>
+                  <a:srgbClr val="0070C0"/>
+                </a:solidFill>
+              </a:rPr>
+              <a:t>6</a:t>
+            </a:r>
+            <a:r>
+              <a:rPr lang="en-GB" sz="1800" dirty="0"/>
+              <a:t>/</a:t>
+            </a:r>
+            <a:r>
+              <a:rPr lang="en-GB" sz="1800" dirty="0">
+                <a:solidFill>
+                  <a:srgbClr val="0070C0"/>
+                </a:solidFill>
+              </a:rPr>
+              <a:t>7</a:t>
+            </a:r>
+            <a:r>
+              <a:rPr lang="en-GB" sz="1800" dirty="0"/>
+              <a:t>) is discharged by the outer quantifier in 18</a:t>
+            </a:r>
+          </a:p>
+          <a:p>
+            <a:pPr marL="285750" indent="-285750">
+              <a:buFont typeface="Arial" panose="020B0604020202020204" pitchFamily="34" charset="0"/>
+              <a:buChar char="•"/>
+            </a:pPr>
+            <a:r>
+              <a:rPr lang="en-GB" sz="1800" dirty="0"/>
+              <a:t>The third </a:t>
+            </a:r>
+            <a:r>
+              <a:rPr lang="en-GB" sz="1800" dirty="0">
+                <a:solidFill>
+                  <a:srgbClr val="8922FD"/>
+                </a:solidFill>
+                <a:latin typeface="Menlo" panose="020B0609030804020204" pitchFamily="49" charset="0"/>
+                <a:ea typeface="Menlo" panose="020B0609030804020204" pitchFamily="49" charset="0"/>
+                <a:cs typeface="Menlo" panose="020B0609030804020204" pitchFamily="49" charset="0"/>
+              </a:rPr>
+              <a:t>Let</a:t>
+            </a:r>
+            <a:r>
+              <a:rPr lang="en-GB" sz="1800" dirty="0"/>
+              <a:t>/</a:t>
+            </a:r>
+            <a:r>
+              <a:rPr lang="en-GB" sz="1800" dirty="0">
+                <a:solidFill>
+                  <a:srgbClr val="8922FD"/>
+                </a:solidFill>
+                <a:latin typeface="Menlo" panose="020B0609030804020204" pitchFamily="49" charset="0"/>
+                <a:ea typeface="Menlo" panose="020B0609030804020204" pitchFamily="49" charset="0"/>
+                <a:cs typeface="Menlo" panose="020B0609030804020204" pitchFamily="49" charset="0"/>
+              </a:rPr>
+              <a:t>Assume</a:t>
+            </a:r>
+            <a:r>
+              <a:rPr lang="en-GB" sz="1800" dirty="0"/>
+              <a:t> pair (</a:t>
+            </a:r>
+            <a:r>
+              <a:rPr lang="en-GB" sz="1800" dirty="0">
+                <a:solidFill>
+                  <a:srgbClr val="0070C0"/>
+                </a:solidFill>
+              </a:rPr>
+              <a:t>8</a:t>
+            </a:r>
+            <a:r>
+              <a:rPr lang="en-GB" sz="1800" dirty="0"/>
+              <a:t>/</a:t>
+            </a:r>
+            <a:r>
+              <a:rPr lang="en-GB" sz="1800" dirty="0">
+                <a:solidFill>
+                  <a:srgbClr val="0070C0"/>
+                </a:solidFill>
+              </a:rPr>
+              <a:t>9</a:t>
+            </a:r>
+            <a:r>
+              <a:rPr lang="en-GB" sz="1800" dirty="0"/>
+              <a:t>) is discharged by the inner quantifier in 18</a:t>
+            </a:r>
+          </a:p>
+          <a:p>
+            <a:pPr marL="285750" indent="-285750">
+              <a:buFont typeface="Arial" panose="020B0604020202020204" pitchFamily="34" charset="0"/>
+              <a:buChar char="•"/>
+            </a:pPr>
+            <a:r>
+              <a:rPr lang="en-GB" sz="1800" dirty="0"/>
+              <a:t>Structured proof often helps the SMT solver by providing additional constraints </a:t>
+            </a:r>
+            <a:r>
+              <a:rPr lang="en-GB" sz="1800" b="1" dirty="0"/>
+              <a:t>reducing the proof search</a:t>
+            </a:r>
+          </a:p>
+          <a:p>
+            <a:pPr marL="285750" indent="-285750">
+              <a:buFont typeface="Arial" panose="020B0604020202020204" pitchFamily="34" charset="0"/>
+              <a:buChar char="•"/>
+            </a:pPr>
+            <a:r>
+              <a:rPr lang="en-GB" sz="1800" dirty="0"/>
+              <a:t>The shown proof is only natural deduction style – it relies entirely on the SMT solver for the facts (</a:t>
+            </a:r>
+            <a:r>
+              <a:rPr lang="en-GB" sz="1800" dirty="0">
+                <a:solidFill>
+                  <a:srgbClr val="8922FD"/>
+                </a:solidFill>
+              </a:rPr>
+              <a:t>Auto</a:t>
+            </a:r>
+            <a:r>
+              <a:rPr lang="en-GB" sz="1800" dirty="0"/>
+              <a:t>)</a:t>
+            </a:r>
+          </a:p>
+        </p:txBody>
+      </p:sp>
+    </p:spTree>
+    <p:extLst>
+      <p:ext uri="{BB962C8B-B14F-4D97-AF65-F5344CB8AC3E}">
+        <p14:creationId xmlns:p14="http://schemas.microsoft.com/office/powerpoint/2010/main" val="3558019795"/>
+      </p:ext>
+    </p:extLst>
+  </p:cSld>
+  <p:clrMapOvr>
+    <a:masterClrMapping/>
+  </p:clrMapOvr>
+</p:sld>
+</file>
+
+<file path=ppt/slides/slide4.xml><?xml version="1.0" encoding="utf-8"?>
+<p:sld xmlns:a="http://schemas.openxmlformats.org/drawingml/2006/main" xmlns:r="http://schemas.openxmlformats.org/officeDocument/2006/relationships" xmlns:p="http://schemas.openxmlformats.org/presentationml/2006/main">
+  <p:cSld>
+    <p:spTree>
+      <p:nvGrpSpPr>
+        <p:cNvPr id="1" name="">
+          <a:extLst>
+            <a:ext uri="{FF2B5EF4-FFF2-40B4-BE49-F238E27FC236}">
+              <a16:creationId xmlns:a16="http://schemas.microsoft.com/office/drawing/2014/main" id="{D332B198-CDBD-B5AC-5EE7-C4CD0CF1EEAB}"/>
+            </a:ext>
+          </a:extLst>
+        </p:cNvPr>
+        <p:cNvGrpSpPr/>
+        <p:nvPr/>
+      </p:nvGrpSpPr>
+      <p:grpSpPr>
+        <a:xfrm>
+          <a:off x="0" y="0"/>
+          <a:ext cx="0" cy="0"/>
+          <a:chOff x="0" y="0"/>
+          <a:chExt cx="0" cy="0"/>
+        </a:xfrm>
+      </p:grpSpPr>
+      <p:sp>
+        <p:nvSpPr>
+          <p:cNvPr id="2" name="Title 1">
+            <a:extLst>
+              <a:ext uri="{FF2B5EF4-FFF2-40B4-BE49-F238E27FC236}">
+                <a16:creationId xmlns:a16="http://schemas.microsoft.com/office/drawing/2014/main" id="{D9E144A5-C168-7254-FB7F-5770894859F5}"/>
+              </a:ext>
+            </a:extLst>
+          </p:cNvPr>
+          <p:cNvSpPr>
+            <a:spLocks noGrp="1"/>
+          </p:cNvSpPr>
+          <p:nvPr>
+            <p:ph type="title"/>
+          </p:nvPr>
+        </p:nvSpPr>
+        <p:spPr/>
+        <p:txBody>
+          <a:bodyPr/>
+          <a:lstStyle/>
+          <a:p>
+            <a:r>
+              <a:rPr lang="en-US" sz="3600" dirty="0"/>
+              <a:t>Structured Proof in </a:t>
+            </a:r>
+            <a:r>
+              <a:rPr lang="en-US" sz="3600" dirty="0" err="1"/>
+              <a:t>Logika</a:t>
+            </a:r>
+            <a:endParaRPr lang="en-US" sz="3600" dirty="0"/>
+          </a:p>
+        </p:txBody>
+      </p:sp>
+      <p:sp>
+        <p:nvSpPr>
+          <p:cNvPr id="128" name="Slide Number Placeholder 127">
+            <a:extLst>
+              <a:ext uri="{FF2B5EF4-FFF2-40B4-BE49-F238E27FC236}">
+                <a16:creationId xmlns:a16="http://schemas.microsoft.com/office/drawing/2014/main" id="{328470CF-7A21-CDE3-5206-B637F11CA645}"/>
+              </a:ext>
+            </a:extLst>
+          </p:cNvPr>
+          <p:cNvSpPr>
+            <a:spLocks noGrp="1"/>
+          </p:cNvSpPr>
+          <p:nvPr>
+            <p:ph type="sldNum" sz="quarter" idx="11"/>
+          </p:nvPr>
+        </p:nvSpPr>
+        <p:spPr/>
+        <p:txBody>
+          <a:bodyPr/>
+          <a:lstStyle/>
+          <a:p>
+            <a:pPr>
+              <a:defRPr/>
+            </a:pPr>
+            <a:fld id="{6E0AA622-F4CE-604D-A669-CD3D12FC535C}" type="slidenum">
+              <a:rPr lang="en-US" smtClean="0"/>
+              <a:pPr>
+                <a:defRPr/>
+              </a:pPr>
+              <a:t>4</a:t>
+            </a:fld>
+            <a:endParaRPr lang="en-US" dirty="0"/>
+          </a:p>
+        </p:txBody>
+      </p:sp>
+      <p:sp>
+        <p:nvSpPr>
+          <p:cNvPr id="3" name="TextBox 2">
+            <a:extLst>
+              <a:ext uri="{FF2B5EF4-FFF2-40B4-BE49-F238E27FC236}">
+                <a16:creationId xmlns:a16="http://schemas.microsoft.com/office/drawing/2014/main" id="{39FE0838-D838-1912-7FC6-307709162906}"/>
+              </a:ext>
+            </a:extLst>
+          </p:cNvPr>
+          <p:cNvSpPr txBox="1"/>
+          <p:nvPr/>
+        </p:nvSpPr>
+        <p:spPr>
+          <a:xfrm>
+            <a:off x="381000" y="1158925"/>
+            <a:ext cx="8016766" cy="338554"/>
+          </a:xfrm>
+          <a:prstGeom prst="rect">
+            <a:avLst/>
+          </a:prstGeom>
+          <a:gradFill flip="none" rotWithShape="1">
+            <a:gsLst>
+              <a:gs pos="0">
+                <a:schemeClr val="bg1"/>
+              </a:gs>
+              <a:gs pos="74000">
+                <a:srgbClr val="FFE267"/>
+              </a:gs>
+              <a:gs pos="83000">
+                <a:srgbClr val="FFE267"/>
+              </a:gs>
+              <a:gs pos="100000">
+                <a:srgbClr val="FFE267"/>
+              </a:gs>
+            </a:gsLst>
+            <a:lin ang="10800000" scaled="1"/>
+            <a:tileRect/>
+          </a:gradFill>
+        </p:spPr>
+        <p:txBody>
+          <a:bodyPr wrap="square" rtlCol="0">
+            <a:spAutoFit/>
+          </a:bodyPr>
+          <a:lstStyle/>
+          <a:p>
+            <a:r>
+              <a:rPr lang="en-US" sz="1600" dirty="0"/>
+              <a:t>Local lemmas with </a:t>
+            </a:r>
+            <a:r>
+              <a:rPr lang="en-US" sz="1600" dirty="0">
+                <a:solidFill>
+                  <a:srgbClr val="8922FD"/>
+                </a:solidFill>
+                <a:latin typeface="Menlo" panose="020B0609030804020204" pitchFamily="49" charset="0"/>
+                <a:ea typeface="Menlo" panose="020B0609030804020204" pitchFamily="49" charset="0"/>
+                <a:cs typeface="Menlo" panose="020B0609030804020204" pitchFamily="49" charset="0"/>
+              </a:rPr>
+              <a:t>Assert</a:t>
+            </a:r>
+          </a:p>
+        </p:txBody>
+      </p:sp>
+      <p:pic>
+        <p:nvPicPr>
+          <p:cNvPr id="6" name="Picture 5" descr="A screenshot of a computer program&#10;&#10;Description automatically generated">
+            <a:extLst>
+              <a:ext uri="{FF2B5EF4-FFF2-40B4-BE49-F238E27FC236}">
+                <a16:creationId xmlns:a16="http://schemas.microsoft.com/office/drawing/2014/main" id="{2BE601B1-566D-94EB-0B9F-80260E9CB772}"/>
+              </a:ext>
+            </a:extLst>
+          </p:cNvPr>
+          <p:cNvPicPr>
+            <a:picLocks noChangeAspect="1"/>
+          </p:cNvPicPr>
+          <p:nvPr/>
+        </p:nvPicPr>
+        <p:blipFill>
+          <a:blip r:embed="rId3"/>
+          <a:stretch>
+            <a:fillRect/>
+          </a:stretch>
+        </p:blipFill>
+        <p:spPr>
+          <a:xfrm>
+            <a:off x="594544" y="1600200"/>
+            <a:ext cx="8356854" cy="3352800"/>
+          </a:xfrm>
+          <a:prstGeom prst="rect">
+            <a:avLst/>
+          </a:prstGeom>
+        </p:spPr>
+      </p:pic>
+      <p:sp>
+        <p:nvSpPr>
+          <p:cNvPr id="7" name="TextBox 6">
+            <a:extLst>
+              <a:ext uri="{FF2B5EF4-FFF2-40B4-BE49-F238E27FC236}">
+                <a16:creationId xmlns:a16="http://schemas.microsoft.com/office/drawing/2014/main" id="{EEF23F74-CEA9-EAEC-E073-873E9A702A15}"/>
+              </a:ext>
+            </a:extLst>
+          </p:cNvPr>
+          <p:cNvSpPr txBox="1"/>
+          <p:nvPr/>
+        </p:nvSpPr>
+        <p:spPr>
+          <a:xfrm>
+            <a:off x="533400" y="5043344"/>
+            <a:ext cx="7391400" cy="646331"/>
+          </a:xfrm>
+          <a:prstGeom prst="rect">
+            <a:avLst/>
+          </a:prstGeom>
+          <a:gradFill flip="none" rotWithShape="1">
+            <a:gsLst>
+              <a:gs pos="0">
+                <a:schemeClr val="accent2">
+                  <a:lumMod val="5000"/>
+                  <a:lumOff val="95000"/>
+                </a:schemeClr>
+              </a:gs>
+              <a:gs pos="74000">
+                <a:schemeClr val="accent2">
+                  <a:lumMod val="45000"/>
+                  <a:lumOff val="55000"/>
+                </a:schemeClr>
+              </a:gs>
+              <a:gs pos="83000">
+                <a:schemeClr val="accent2">
+                  <a:lumMod val="45000"/>
+                  <a:lumOff val="55000"/>
+                </a:schemeClr>
+              </a:gs>
+              <a:gs pos="100000">
+                <a:schemeClr val="accent2">
+                  <a:lumMod val="30000"/>
+                  <a:lumOff val="70000"/>
+                </a:schemeClr>
+              </a:gs>
+            </a:gsLst>
+            <a:lin ang="10800000" scaled="1"/>
+            <a:tileRect/>
+          </a:gradFill>
+        </p:spPr>
+        <p:txBody>
+          <a:bodyPr wrap="square" rtlCol="0">
+            <a:spAutoFit/>
+          </a:bodyPr>
+          <a:lstStyle/>
+          <a:p>
+            <a:r>
+              <a:rPr lang="en-GB" sz="1800" dirty="0"/>
+              <a:t>The </a:t>
+            </a:r>
+            <a:r>
+              <a:rPr lang="en-GB" sz="1800" dirty="0" err="1"/>
+              <a:t>subproof</a:t>
+            </a:r>
+            <a:r>
+              <a:rPr lang="en-GB" sz="1800" dirty="0"/>
+              <a:t> after the assert hides the facts in the </a:t>
+            </a:r>
+            <a:r>
+              <a:rPr lang="en-GB" sz="1800" dirty="0" err="1"/>
+              <a:t>subproof</a:t>
+            </a:r>
+            <a:r>
+              <a:rPr lang="en-GB" sz="1800" dirty="0"/>
+              <a:t> like a local block in a program.</a:t>
+            </a:r>
+          </a:p>
+        </p:txBody>
+      </p:sp>
+    </p:spTree>
+    <p:extLst>
+      <p:ext uri="{BB962C8B-B14F-4D97-AF65-F5344CB8AC3E}">
+        <p14:creationId xmlns:p14="http://schemas.microsoft.com/office/powerpoint/2010/main" val="746708565"/>
+      </p:ext>
+    </p:extLst>
+  </p:cSld>
+  <p:clrMapOvr>
+    <a:masterClrMapping/>
+  </p:clrMapOvr>
+</p:sld>
+</file>
+
+<file path=ppt/slides/slide5.xml><?xml version="1.0" encoding="utf-8"?>
+<p:sld xmlns:a="http://schemas.openxmlformats.org/drawingml/2006/main" xmlns:r="http://schemas.openxmlformats.org/officeDocument/2006/relationships" xmlns:p="http://schemas.openxmlformats.org/presentationml/2006/main">
+  <p:cSld>
+    <p:spTree>
+      <p:nvGrpSpPr>
+        <p:cNvPr id="1" name="">
+          <a:extLst>
+            <a:ext uri="{FF2B5EF4-FFF2-40B4-BE49-F238E27FC236}">
+              <a16:creationId xmlns:a16="http://schemas.microsoft.com/office/drawing/2014/main" id="{46757BC5-ACA6-11B8-31C9-7C69A4E86DA9}"/>
+            </a:ext>
+          </a:extLst>
+        </p:cNvPr>
+        <p:cNvGrpSpPr/>
+        <p:nvPr/>
+      </p:nvGrpSpPr>
+      <p:grpSpPr>
+        <a:xfrm>
+          <a:off x="0" y="0"/>
+          <a:ext cx="0" cy="0"/>
+          <a:chOff x="0" y="0"/>
+          <a:chExt cx="0" cy="0"/>
+        </a:xfrm>
+      </p:grpSpPr>
+      <p:sp>
+        <p:nvSpPr>
+          <p:cNvPr id="2" name="Title 1">
+            <a:extLst>
+              <a:ext uri="{FF2B5EF4-FFF2-40B4-BE49-F238E27FC236}">
+                <a16:creationId xmlns:a16="http://schemas.microsoft.com/office/drawing/2014/main" id="{E88CAE73-D095-D800-F8B3-DC61A372D03C}"/>
+              </a:ext>
+            </a:extLst>
+          </p:cNvPr>
+          <p:cNvSpPr>
+            <a:spLocks noGrp="1"/>
+          </p:cNvSpPr>
+          <p:nvPr>
+            <p:ph type="title"/>
+          </p:nvPr>
+        </p:nvSpPr>
+        <p:spPr/>
+        <p:txBody>
+          <a:bodyPr/>
+          <a:lstStyle/>
+          <a:p>
+            <a:r>
+              <a:rPr lang="en-US" sz="3600" dirty="0"/>
+              <a:t>Proof in </a:t>
+            </a:r>
+            <a:r>
+              <a:rPr lang="en-US" sz="3600" dirty="0" err="1"/>
+              <a:t>Logika</a:t>
+            </a:r>
+            <a:endParaRPr lang="en-US" sz="3600" dirty="0"/>
+          </a:p>
+        </p:txBody>
+      </p:sp>
+      <p:sp>
+        <p:nvSpPr>
+          <p:cNvPr id="128" name="Slide Number Placeholder 127">
+            <a:extLst>
+              <a:ext uri="{FF2B5EF4-FFF2-40B4-BE49-F238E27FC236}">
+                <a16:creationId xmlns:a16="http://schemas.microsoft.com/office/drawing/2014/main" id="{78F4710E-0147-159A-8B50-F0D8F6677AB8}"/>
+              </a:ext>
+            </a:extLst>
+          </p:cNvPr>
+          <p:cNvSpPr>
+            <a:spLocks noGrp="1"/>
+          </p:cNvSpPr>
+          <p:nvPr>
+            <p:ph type="sldNum" sz="quarter" idx="11"/>
+          </p:nvPr>
+        </p:nvSpPr>
+        <p:spPr/>
+        <p:txBody>
+          <a:bodyPr/>
+          <a:lstStyle/>
+          <a:p>
+            <a:pPr>
+              <a:defRPr/>
+            </a:pPr>
+            <a:fld id="{6E0AA622-F4CE-604D-A669-CD3D12FC535C}" type="slidenum">
+              <a:rPr lang="en-US" smtClean="0"/>
+              <a:pPr>
+                <a:defRPr/>
+              </a:pPr>
+              <a:t>5</a:t>
+            </a:fld>
+            <a:endParaRPr lang="en-US" dirty="0"/>
+          </a:p>
+        </p:txBody>
+      </p:sp>
+      <p:sp>
+        <p:nvSpPr>
+          <p:cNvPr id="3" name="TextBox 2">
+            <a:extLst>
+              <a:ext uri="{FF2B5EF4-FFF2-40B4-BE49-F238E27FC236}">
+                <a16:creationId xmlns:a16="http://schemas.microsoft.com/office/drawing/2014/main" id="{9F9B07E7-B8E6-6343-64F9-9B3BE839AD42}"/>
+              </a:ext>
+            </a:extLst>
+          </p:cNvPr>
+          <p:cNvSpPr txBox="1"/>
+          <p:nvPr/>
+        </p:nvSpPr>
+        <p:spPr>
+          <a:xfrm>
+            <a:off x="381000" y="1158925"/>
+            <a:ext cx="8016766" cy="338554"/>
+          </a:xfrm>
+          <a:prstGeom prst="rect">
+            <a:avLst/>
+          </a:prstGeom>
+          <a:gradFill flip="none" rotWithShape="1">
+            <a:gsLst>
+              <a:gs pos="0">
+                <a:schemeClr val="bg1"/>
+              </a:gs>
+              <a:gs pos="74000">
+                <a:srgbClr val="FFE267"/>
+              </a:gs>
+              <a:gs pos="83000">
+                <a:srgbClr val="FFE267"/>
+              </a:gs>
+              <a:gs pos="100000">
+                <a:srgbClr val="FFE267"/>
+              </a:gs>
+            </a:gsLst>
+            <a:lin ang="10800000" scaled="1"/>
+            <a:tileRect/>
+          </a:gradFill>
+        </p:spPr>
+        <p:txBody>
+          <a:bodyPr wrap="square" rtlCol="0">
+            <a:spAutoFit/>
+          </a:bodyPr>
+          <a:lstStyle/>
+          <a:p>
+            <a:r>
+              <a:rPr lang="en-US" sz="1600" dirty="0"/>
+              <a:t>Natural Deduction Proofs</a:t>
+            </a:r>
+          </a:p>
+        </p:txBody>
+      </p:sp>
+      <p:sp>
+        <p:nvSpPr>
+          <p:cNvPr id="4" name="TextBox 3">
+            <a:extLst>
+              <a:ext uri="{FF2B5EF4-FFF2-40B4-BE49-F238E27FC236}">
+                <a16:creationId xmlns:a16="http://schemas.microsoft.com/office/drawing/2014/main" id="{72ADA4B7-A5DF-C7EF-63C9-D230E30E0D11}"/>
+              </a:ext>
+            </a:extLst>
+          </p:cNvPr>
+          <p:cNvSpPr txBox="1"/>
+          <p:nvPr/>
+        </p:nvSpPr>
+        <p:spPr>
+          <a:xfrm>
+            <a:off x="533400" y="1600200"/>
+            <a:ext cx="7391400" cy="1200329"/>
+          </a:xfrm>
+          <a:prstGeom prst="rect">
+            <a:avLst/>
+          </a:prstGeom>
+          <a:noFill/>
+        </p:spPr>
+        <p:txBody>
+          <a:bodyPr wrap="square" rtlCol="0">
+            <a:spAutoFit/>
+          </a:bodyPr>
+          <a:lstStyle/>
+          <a:p>
+            <a:r>
+              <a:rPr lang="en-GB" sz="1800" dirty="0"/>
+              <a:t>Many facts have the shape of equalities, e.g.,</a:t>
+            </a:r>
+          </a:p>
+          <a:p>
+            <a:pPr marL="285750" indent="-285750">
+              <a:buFont typeface="Arial" panose="020B0604020202020204" pitchFamily="34" charset="0"/>
+              <a:buChar char="•"/>
+            </a:pPr>
+            <a:r>
+              <a:rPr lang="en-GB" sz="1800" dirty="0"/>
+              <a:t>Properties of numbers like </a:t>
+            </a:r>
+            <a:r>
+              <a:rPr lang="en-GB" sz="1800" dirty="0">
+                <a:solidFill>
+                  <a:srgbClr val="8922FD"/>
+                </a:solidFill>
+                <a:latin typeface="Menlo" panose="020B0609030804020204" pitchFamily="49" charset="0"/>
+                <a:ea typeface="Menlo" panose="020B0609030804020204" pitchFamily="49" charset="0"/>
+                <a:cs typeface="Menlo" panose="020B0609030804020204" pitchFamily="49" charset="0"/>
+              </a:rPr>
+              <a:t>x + 0 = x</a:t>
+            </a:r>
+          </a:p>
+          <a:p>
+            <a:pPr marL="285750" indent="-285750">
+              <a:buFont typeface="Arial" panose="020B0604020202020204" pitchFamily="34" charset="0"/>
+              <a:buChar char="•"/>
+            </a:pPr>
+            <a:r>
+              <a:rPr lang="en-GB" sz="1800" dirty="0"/>
+              <a:t>Function definitions like </a:t>
+            </a:r>
+            <a:r>
+              <a:rPr lang="en-GB" sz="1800" dirty="0">
+                <a:solidFill>
+                  <a:srgbClr val="8922FD"/>
+                </a:solidFill>
+                <a:latin typeface="Menlo" panose="020B0609030804020204" pitchFamily="49" charset="0"/>
+                <a:ea typeface="Menlo" panose="020B0609030804020204" pitchFamily="49" charset="0"/>
+                <a:cs typeface="Menlo" panose="020B0609030804020204" pitchFamily="49" charset="0"/>
+              </a:rPr>
+              <a:t>f(x) = if (x &gt; 0) then x else 0</a:t>
+            </a:r>
+          </a:p>
+          <a:p>
+            <a:pPr marL="285750" indent="-285750">
+              <a:buFont typeface="Arial" panose="020B0604020202020204" pitchFamily="34" charset="0"/>
+              <a:buChar char="•"/>
+            </a:pPr>
+            <a:r>
+              <a:rPr lang="en-GB" sz="1800" dirty="0"/>
+              <a:t>Properties derived from the above </a:t>
+            </a:r>
+          </a:p>
+        </p:txBody>
+      </p:sp>
+    </p:spTree>
+    <p:extLst>
+      <p:ext uri="{BB962C8B-B14F-4D97-AF65-F5344CB8AC3E}">
+        <p14:creationId xmlns:p14="http://schemas.microsoft.com/office/powerpoint/2010/main" val="187878689"/>
       </p:ext>
     </p:extLst>
   </p:cSld>

</xml_diff>

<commit_message>
Finished Slang examples and exercises
</commit_message>
<xml_diff>
--- a/slides/A-01-02-Proofs-Structure.pptx
+++ b/slides/A-01-02-Proofs-Structure.pptx
@@ -6527,13 +6527,8 @@
           <a:p>
             <a:r>
               <a:rPr lang="en-US" sz="3600" dirty="0"/>
-              <a:t>Proof in </a:t>
-            </a:r>
-            <a:r>
-              <a:rPr lang="en-US" sz="3600" dirty="0" err="1"/>
-              <a:t>Logika</a:t>
-            </a:r>
-            <a:endParaRPr lang="en-US" sz="3600" dirty="0"/>
+              <a:t>Proof Exercise</a:t>
+            </a:r>
           </a:p>
         </p:txBody>
       </p:sp>
@@ -6619,55 +6614,10 @@
           <a:p>
             <a:r>
               <a:rPr lang="en-US" sz="1600" dirty="0"/>
-              <a:t>Natural Deduction Proofs</a:t>
-            </a:r>
-          </a:p>
-        </p:txBody>
-      </p:sp>
-      <p:sp>
-        <p:nvSpPr>
-          <p:cNvPr id="4" name="TextBox 3">
-            <a:extLst>
-              <a:ext uri="{FF2B5EF4-FFF2-40B4-BE49-F238E27FC236}">
-                <a16:creationId xmlns:a16="http://schemas.microsoft.com/office/drawing/2014/main" id="{72ADA4B7-A5DF-C7EF-63C9-D230E30E0D11}"/>
-              </a:ext>
-            </a:extLst>
-          </p:cNvPr>
-          <p:cNvSpPr txBox="1"/>
-          <p:nvPr/>
-        </p:nvSpPr>
-        <p:spPr>
-          <a:xfrm>
-            <a:off x="533400" y="1600200"/>
-            <a:ext cx="7391400" cy="1200329"/>
-          </a:xfrm>
-          <a:prstGeom prst="rect">
-            <a:avLst/>
-          </a:prstGeom>
-          <a:noFill/>
-        </p:spPr>
-        <p:txBody>
-          <a:bodyPr wrap="square" rtlCol="0">
-            <a:spAutoFit/>
-          </a:bodyPr>
-          <a:lstStyle/>
-          <a:p>
-            <a:r>
-              <a:rPr lang="en-GB" sz="1800" dirty="0"/>
-              <a:t>Many facts have the shape of equalities, e.g.,</a:t>
-            </a:r>
-          </a:p>
-          <a:p>
-            <a:pPr marL="285750" indent="-285750">
-              <a:buFont typeface="Arial" panose="020B0604020202020204" pitchFamily="34" charset="0"/>
-              <a:buChar char="•"/>
-            </a:pPr>
-            <a:r>
-              <a:rPr lang="en-GB" sz="1800" dirty="0"/>
-              <a:t>Properties of numbers like </a:t>
-            </a:r>
-            <a:r>
-              <a:rPr lang="en-GB" sz="1800" dirty="0">
+              <a:t>Devise simplification rewriting rules for use with </a:t>
+            </a:r>
+            <a:r>
+              <a:rPr lang="en-US" sz="1600" dirty="0" err="1">
                 <a:solidFill>
                   <a:srgbClr val="8922FD"/>
                 </a:solidFill>
@@ -6675,20 +6625,100 @@
                 <a:ea typeface="Menlo" panose="020B0609030804020204" pitchFamily="49" charset="0"/>
                 <a:cs typeface="Menlo" panose="020B0609030804020204" pitchFamily="49" charset="0"/>
               </a:rPr>
-              <a:t>x + 0 = x</a:t>
-            </a:r>
-          </a:p>
-          <a:p>
-            <a:pPr marL="285750" indent="-285750">
-              <a:buFont typeface="Arial" panose="020B0604020202020204" pitchFamily="34" charset="0"/>
-              <a:buChar char="•"/>
-            </a:pPr>
-            <a:r>
-              <a:rPr lang="en-GB" sz="1800" dirty="0"/>
-              <a:t>Function definitions like </a:t>
-            </a:r>
-            <a:r>
-              <a:rPr lang="en-GB" sz="1800" dirty="0">
+              <a:t>RSimpl</a:t>
+            </a:r>
+            <a:endParaRPr lang="en-US" sz="1600" dirty="0">
+              <a:solidFill>
+                <a:srgbClr val="8922FD"/>
+              </a:solidFill>
+              <a:latin typeface="Menlo" panose="020B0609030804020204" pitchFamily="49" charset="0"/>
+              <a:ea typeface="Menlo" panose="020B0609030804020204" pitchFamily="49" charset="0"/>
+              <a:cs typeface="Menlo" panose="020B0609030804020204" pitchFamily="49" charset="0"/>
+            </a:endParaRPr>
+          </a:p>
+        </p:txBody>
+      </p:sp>
+      <p:pic>
+        <p:nvPicPr>
+          <p:cNvPr id="6" name="Picture 5">
+            <a:extLst>
+              <a:ext uri="{FF2B5EF4-FFF2-40B4-BE49-F238E27FC236}">
+                <a16:creationId xmlns:a16="http://schemas.microsoft.com/office/drawing/2014/main" id="{0280BC2B-F495-0F8B-9DB5-A463D038CC4A}"/>
+              </a:ext>
+            </a:extLst>
+          </p:cNvPr>
+          <p:cNvPicPr>
+            <a:picLocks noChangeAspect="1"/>
+          </p:cNvPicPr>
+          <p:nvPr/>
+        </p:nvPicPr>
+        <p:blipFill>
+          <a:blip r:embed="rId3"/>
+          <a:stretch>
+            <a:fillRect/>
+          </a:stretch>
+        </p:blipFill>
+        <p:spPr>
+          <a:xfrm>
+            <a:off x="574854" y="1521452"/>
+            <a:ext cx="4234928" cy="5260348"/>
+          </a:xfrm>
+          <a:prstGeom prst="rect">
+            <a:avLst/>
+          </a:prstGeom>
+        </p:spPr>
+      </p:pic>
+      <p:sp>
+        <p:nvSpPr>
+          <p:cNvPr id="7" name="TextBox 6">
+            <a:extLst>
+              <a:ext uri="{FF2B5EF4-FFF2-40B4-BE49-F238E27FC236}">
+                <a16:creationId xmlns:a16="http://schemas.microsoft.com/office/drawing/2014/main" id="{06B7C63C-D8E6-6510-F7BE-EDA9246E2119}"/>
+              </a:ext>
+            </a:extLst>
+          </p:cNvPr>
+          <p:cNvSpPr txBox="1"/>
+          <p:nvPr/>
+        </p:nvSpPr>
+        <p:spPr>
+          <a:xfrm>
+            <a:off x="5257800" y="1515116"/>
+            <a:ext cx="2971800" cy="584775"/>
+          </a:xfrm>
+          <a:prstGeom prst="rect">
+            <a:avLst/>
+          </a:prstGeom>
+          <a:gradFill flip="none" rotWithShape="1">
+            <a:gsLst>
+              <a:gs pos="0">
+                <a:schemeClr val="bg1"/>
+              </a:gs>
+              <a:gs pos="74000">
+                <a:srgbClr val="FFE267"/>
+              </a:gs>
+              <a:gs pos="83000">
+                <a:srgbClr val="FFE267"/>
+              </a:gs>
+              <a:gs pos="100000">
+                <a:srgbClr val="FFE267"/>
+              </a:gs>
+            </a:gsLst>
+            <a:lin ang="10800000" scaled="1"/>
+            <a:tileRect/>
+          </a:gradFill>
+        </p:spPr>
+        <p:txBody>
+          <a:bodyPr wrap="square" rtlCol="0">
+            <a:spAutoFit/>
+          </a:bodyPr>
+          <a:lstStyle/>
+          <a:p>
+            <a:r>
+              <a:rPr lang="en-US" sz="1600" dirty="0"/>
+              <a:t>(A) Devise the missing rules </a:t>
+            </a:r>
+            <a:r>
+              <a:rPr lang="en-US" sz="1600" dirty="0" err="1">
                 <a:solidFill>
                   <a:srgbClr val="8922FD"/>
                 </a:solidFill>
@@ -6696,18 +6726,118 @@
                 <a:ea typeface="Menlo" panose="020B0609030804020204" pitchFamily="49" charset="0"/>
                 <a:cs typeface="Menlo" panose="020B0609030804020204" pitchFamily="49" charset="0"/>
               </a:rPr>
-              <a:t>f(x) = if (x &gt; 0) then x else 0</a:t>
-            </a:r>
-          </a:p>
-          <a:p>
-            <a:pPr marL="285750" indent="-285750">
-              <a:buFont typeface="Arial" panose="020B0604020202020204" pitchFamily="34" charset="0"/>
-              <a:buChar char="•"/>
-            </a:pPr>
-            <a:r>
-              <a:rPr lang="en-GB" sz="1800" dirty="0"/>
-              <a:t>Properties derived from the above </a:t>
-            </a:r>
+              <a:t>minL</a:t>
+            </a:r>
+            <a:r>
+              <a:rPr lang="en-US" sz="1600" dirty="0"/>
+              <a:t>, </a:t>
+            </a:r>
+            <a:r>
+              <a:rPr lang="en-US" sz="1600" dirty="0" err="1">
+                <a:solidFill>
+                  <a:srgbClr val="8922FD"/>
+                </a:solidFill>
+                <a:latin typeface="Menlo" panose="020B0609030804020204" pitchFamily="49" charset="0"/>
+                <a:ea typeface="Menlo" panose="020B0609030804020204" pitchFamily="49" charset="0"/>
+                <a:cs typeface="Menlo" panose="020B0609030804020204" pitchFamily="49" charset="0"/>
+              </a:rPr>
+              <a:t>minR</a:t>
+            </a:r>
+            <a:r>
+              <a:rPr lang="en-US" sz="1600" dirty="0"/>
+              <a:t>, </a:t>
+            </a:r>
+            <a:r>
+              <a:rPr lang="en-US" sz="1600" dirty="0" err="1">
+                <a:solidFill>
+                  <a:srgbClr val="8922FD"/>
+                </a:solidFill>
+                <a:latin typeface="Menlo" panose="020B0609030804020204" pitchFamily="49" charset="0"/>
+                <a:ea typeface="Menlo" panose="020B0609030804020204" pitchFamily="49" charset="0"/>
+                <a:cs typeface="Menlo" panose="020B0609030804020204" pitchFamily="49" charset="0"/>
+              </a:rPr>
+              <a:t>maxL</a:t>
+            </a:r>
+            <a:r>
+              <a:rPr lang="en-US" sz="1600" dirty="0"/>
+              <a:t>, </a:t>
+            </a:r>
+            <a:r>
+              <a:rPr lang="en-US" sz="1600" dirty="0" err="1">
+                <a:solidFill>
+                  <a:srgbClr val="8922FD"/>
+                </a:solidFill>
+                <a:latin typeface="Menlo" panose="020B0609030804020204" pitchFamily="49" charset="0"/>
+                <a:ea typeface="Menlo" panose="020B0609030804020204" pitchFamily="49" charset="0"/>
+                <a:cs typeface="Menlo" panose="020B0609030804020204" pitchFamily="49" charset="0"/>
+              </a:rPr>
+              <a:t>maxR</a:t>
+            </a:r>
+            <a:endParaRPr lang="en-US" sz="1600" dirty="0">
+              <a:solidFill>
+                <a:srgbClr val="8922FD"/>
+              </a:solidFill>
+              <a:latin typeface="Menlo" panose="020B0609030804020204" pitchFamily="49" charset="0"/>
+              <a:ea typeface="Menlo" panose="020B0609030804020204" pitchFamily="49" charset="0"/>
+              <a:cs typeface="Menlo" panose="020B0609030804020204" pitchFamily="49" charset="0"/>
+            </a:endParaRPr>
+          </a:p>
+        </p:txBody>
+      </p:sp>
+      <p:sp>
+        <p:nvSpPr>
+          <p:cNvPr id="8" name="TextBox 7">
+            <a:extLst>
+              <a:ext uri="{FF2B5EF4-FFF2-40B4-BE49-F238E27FC236}">
+                <a16:creationId xmlns:a16="http://schemas.microsoft.com/office/drawing/2014/main" id="{E5588677-A9A3-CFB7-3952-62ED4210A036}"/>
+              </a:ext>
+            </a:extLst>
+          </p:cNvPr>
+          <p:cNvSpPr txBox="1"/>
+          <p:nvPr/>
+        </p:nvSpPr>
+        <p:spPr>
+          <a:xfrm>
+            <a:off x="5250094" y="2514600"/>
+            <a:ext cx="3505200" cy="338554"/>
+          </a:xfrm>
+          <a:prstGeom prst="rect">
+            <a:avLst/>
+          </a:prstGeom>
+          <a:gradFill flip="none" rotWithShape="1">
+            <a:gsLst>
+              <a:gs pos="0">
+                <a:schemeClr val="bg1"/>
+              </a:gs>
+              <a:gs pos="74000">
+                <a:srgbClr val="FFE267"/>
+              </a:gs>
+              <a:gs pos="83000">
+                <a:srgbClr val="FFE267"/>
+              </a:gs>
+              <a:gs pos="100000">
+                <a:srgbClr val="FFE267"/>
+              </a:gs>
+            </a:gsLst>
+            <a:lin ang="10800000" scaled="1"/>
+            <a:tileRect/>
+          </a:gradFill>
+        </p:spPr>
+        <p:txBody>
+          <a:bodyPr wrap="square" rtlCol="0">
+            <a:spAutoFit/>
+          </a:bodyPr>
+          <a:lstStyle/>
+          <a:p>
+            <a:r>
+              <a:rPr lang="en-US" sz="1600" dirty="0"/>
+              <a:t>(B) Ensure the </a:t>
+            </a:r>
+            <a:r>
+              <a:rPr lang="en-US" sz="1600"/>
+              <a:t>proof succeeds!</a:t>
+            </a:r>
+            <a:endParaRPr lang="en-US" sz="1600" dirty="0"/>
           </a:p>
         </p:txBody>
       </p:sp>

</xml_diff>